<commit_message>
updated application for debugging and the Introduction presentation
</commit_message>
<xml_diff>
--- a/javascript_basics/Introduction.pptx
+++ b/javascript_basics/Introduction.pptx
@@ -5506,26 +5506,27 @@
             </a:r>
             <a:r>
               <a:rPr lang="en-US" dirty="0" smtClean="0"/>
-              <a:t>Manipulation presentation covers:</a:t>
+              <a:t>Manipulation presentation </a:t>
+            </a:r>
+            <a:r>
+              <a:rPr lang="en-US" dirty="0" smtClean="0"/>
+              <a:t>covers:</a:t>
             </a:r>
           </a:p>
           <a:p>
             <a:pPr lvl="1"/>
             <a:r>
-              <a:rPr lang="en-US" dirty="0"/>
+              <a:rPr lang="en-US" dirty="0" smtClean="0"/>
               <a:t>JS native functions</a:t>
             </a:r>
           </a:p>
           <a:p>
             <a:pPr lvl="1"/>
             <a:r>
-              <a:rPr lang="en-US" dirty="0"/>
-              <a:t>jQuery manipulation (selectors &amp; functions</a:t>
-            </a:r>
-            <a:r>
               <a:rPr lang="en-US" dirty="0" smtClean="0"/>
-              <a:t>)</a:t>
-            </a:r>
+              <a:t>jQuery manipulation (selectors &amp; functions)</a:t>
+            </a:r>
+            <a:endParaRPr lang="en-US" dirty="0" smtClean="0"/>
           </a:p>
         </p:txBody>
       </p:sp>
@@ -5610,43 +5611,8 @@
             </a:r>
             <a:r>
               <a:rPr lang="en-US" dirty="0" smtClean="0"/>
-              <a:t>presentation covers:</a:t>
-            </a:r>
-          </a:p>
-          <a:p>
-            <a:pPr lvl="1"/>
-            <a:r>
-              <a:rPr lang="en-US" dirty="0" smtClean="0"/>
-              <a:t>Event bubbling </a:t>
-            </a:r>
-            <a:r>
-              <a:rPr lang="en-US" dirty="0"/>
-              <a:t>&amp; capturing</a:t>
-            </a:r>
-          </a:p>
-          <a:p>
-            <a:pPr lvl="1"/>
-            <a:r>
-              <a:rPr lang="en-US" dirty="0"/>
-              <a:t>JS </a:t>
-            </a:r>
-            <a:r>
-              <a:rPr lang="en-US" dirty="0" smtClean="0"/>
-              <a:t>native event functions</a:t>
-            </a:r>
-            <a:endParaRPr lang="en-US" dirty="0"/>
-          </a:p>
-          <a:p>
-            <a:pPr lvl="1"/>
-            <a:r>
-              <a:rPr lang="en-US" dirty="0" smtClean="0"/>
-              <a:t>jQuery event functions</a:t>
-            </a:r>
-          </a:p>
-          <a:p>
-            <a:pPr marL="457200" lvl="1" indent="0">
-              <a:buNone/>
-            </a:pPr>
+              <a:t>presentation explains event bubbling and capturing, how we can listen for events on DOM elements, and different ways to implement listeners using vanilla JavaScript and jQuery.</a:t>
+            </a:r>
             <a:endParaRPr lang="en-US" dirty="0"/>
           </a:p>
         </p:txBody>
@@ -5725,28 +5691,19 @@
             </a:r>
             <a:r>
               <a:rPr lang="en-US" dirty="0" smtClean="0"/>
-              <a:t>presentation covers:</a:t>
-            </a:r>
-          </a:p>
-          <a:p>
-            <a:pPr lvl="1"/>
-            <a:r>
-              <a:rPr lang="en-US" dirty="0"/>
-              <a:t>Functions as constructors</a:t>
-            </a:r>
-          </a:p>
-          <a:p>
-            <a:pPr lvl="1"/>
-            <a:r>
-              <a:rPr lang="en-US" dirty="0"/>
-              <a:t>Prototyping</a:t>
-            </a:r>
-          </a:p>
-          <a:p>
-            <a:pPr lvl="1"/>
-            <a:r>
-              <a:rPr lang="en-US" dirty="0" err="1"/>
-              <a:t>Namespacing</a:t>
+              <a:t>presentation </a:t>
+            </a:r>
+            <a:r>
+              <a:rPr lang="en-US" dirty="0" smtClean="0"/>
+              <a:t>covers JavaScript’s prototypical inheritance, different ways to create new objects and how </a:t>
+            </a:r>
+            <a:r>
+              <a:rPr lang="en-US" dirty="0" err="1" smtClean="0"/>
+              <a:t>namespacing</a:t>
+            </a:r>
+            <a:r>
+              <a:rPr lang="en-US" dirty="0" smtClean="0"/>
+              <a:t> can be used to reduce global variables.</a:t>
             </a:r>
             <a:endParaRPr lang="en-US" dirty="0"/>
           </a:p>
@@ -5932,19 +5889,13 @@
           <a:p>
             <a:r>
               <a:rPr lang="en-US" dirty="0"/>
-              <a:t>Best practices</a:t>
+              <a:t>Best </a:t>
             </a:r>
             <a:r>
               <a:rPr lang="en-US" dirty="0" smtClean="0"/>
-              <a:t>:</a:t>
-            </a:r>
-          </a:p>
-          <a:p>
-            <a:pPr lvl="1"/>
-            <a:r>
-              <a:rPr lang="en-US" dirty="0" smtClean="0"/>
-              <a:t>Covers best practices for HTML, CSS and JavaScript</a:t>
-            </a:r>
+              <a:t>practices presentation provides a basic guideline on how to organize and write HTML, CSS and JavaScript code.</a:t>
+            </a:r>
+            <a:endParaRPr lang="en-US" dirty="0" smtClean="0"/>
           </a:p>
         </p:txBody>
       </p:sp>
@@ -6022,19 +5973,49 @@
             </a:r>
           </a:p>
           <a:p>
-            <a:pPr lvl="1"/>
             <a:r>
               <a:rPr lang="en-US" dirty="0" smtClean="0"/>
-              <a:t>Live session using a more complex application</a:t>
-            </a:r>
-          </a:p>
-          <a:p>
-            <a:pPr lvl="1"/>
+              <a:t>To get a better understanding of how Chrome Developer Tools can be used we created an </a:t>
+            </a:r>
+            <a:r>
+              <a:rPr lang="en-US" dirty="0" err="1" smtClean="0"/>
+              <a:t>AngularJs</a:t>
+            </a:r>
             <a:r>
               <a:rPr lang="en-US" dirty="0" smtClean="0"/>
-              <a:t>Chrome Developer Tools</a:t>
-            </a:r>
-            <a:endParaRPr lang="en-US" dirty="0"/>
+              <a:t> application that gets the data from a </a:t>
+            </a:r>
+            <a:r>
+              <a:rPr lang="en-US" dirty="0" err="1" smtClean="0"/>
+              <a:t>NodeJs</a:t>
+            </a:r>
+            <a:r>
+              <a:rPr lang="en-US" dirty="0" smtClean="0"/>
+              <a:t> server.</a:t>
+            </a:r>
+          </a:p>
+          <a:p>
+            <a:pPr marL="0" indent="0">
+              <a:buNone/>
+            </a:pPr>
+            <a:endParaRPr lang="en-US" dirty="0" smtClean="0"/>
+          </a:p>
+          <a:p>
+            <a:r>
+              <a:rPr lang="en-US" dirty="0" smtClean="0"/>
+              <a:t>The instructions on how to run the applications are in the Read Me files of the applications.</a:t>
+            </a:r>
+          </a:p>
+          <a:p>
+            <a:r>
+              <a:rPr lang="en-US" dirty="0" smtClean="0"/>
+              <a:t>Feel free </a:t>
+            </a:r>
+            <a:r>
+              <a:rPr lang="en-US" smtClean="0"/>
+              <a:t>to ask for help</a:t>
+            </a:r>
+            <a:endParaRPr lang="en-US" dirty="0" smtClean="0"/>
           </a:p>
         </p:txBody>
       </p:sp>
@@ -6181,7 +6162,12 @@
             <p:ph type="title"/>
           </p:nvPr>
         </p:nvSpPr>
-        <p:spPr/>
+        <p:spPr>
+          <a:xfrm>
+            <a:off x="684212" y="4861168"/>
+            <a:ext cx="8534400" cy="1563077"/>
+          </a:xfrm>
+        </p:spPr>
         <p:txBody>
           <a:bodyPr/>
           <a:lstStyle/>
@@ -6205,8 +6191,8 @@
         </p:nvSpPr>
         <p:spPr>
           <a:xfrm>
-            <a:off x="684212" y="375138"/>
-            <a:ext cx="8534400" cy="3925929"/>
+            <a:off x="684212" y="164123"/>
+            <a:ext cx="8534400" cy="4861169"/>
           </a:xfrm>
         </p:spPr>
         <p:txBody>
@@ -6214,59 +6200,110 @@
           <a:lstStyle/>
           <a:p>
             <a:r>
-              <a:rPr lang="en-GB" b="1" dirty="0"/>
-              <a:t>Introduction to the </a:t>
-            </a:r>
-            <a:r>
-              <a:rPr lang="en-GB" b="1" dirty="0" smtClean="0"/>
-              <a:t>course:</a:t>
-            </a:r>
-            <a:endParaRPr lang="en-GB" b="1" dirty="0"/>
-          </a:p>
-          <a:p>
-            <a:endParaRPr lang="en-GB" dirty="0"/>
-          </a:p>
-          <a:p>
-            <a:r>
-              <a:rPr lang="en-GB" dirty="0"/>
-              <a:t>For beginners</a:t>
-            </a:r>
-          </a:p>
-          <a:p>
-            <a:r>
-              <a:rPr lang="en-GB" dirty="0" smtClean="0"/>
-              <a:t>Covers the basic </a:t>
-            </a:r>
-            <a:r>
-              <a:rPr lang="en-GB" dirty="0"/>
+              <a:rPr lang="en-GB" sz="1800" dirty="0" smtClean="0"/>
+              <a:t>This course was created for new developers </a:t>
+            </a:r>
+            <a:r>
+              <a:rPr lang="en-GB" sz="1800" dirty="0" smtClean="0"/>
+              <a:t>who have less experience </a:t>
+            </a:r>
+            <a:r>
+              <a:rPr lang="en-GB" sz="1800" dirty="0"/>
+              <a:t>with HTML, CSS and </a:t>
+            </a:r>
+            <a:r>
+              <a:rPr lang="en-GB" sz="1800" dirty="0" smtClean="0"/>
+              <a:t>JavaScript.</a:t>
+            </a:r>
+          </a:p>
+          <a:p>
+            <a:endParaRPr lang="en-GB" sz="1800" dirty="0" smtClean="0"/>
+          </a:p>
+          <a:p>
+            <a:r>
+              <a:rPr lang="en-GB" sz="1800" dirty="0" smtClean="0"/>
+              <a:t>Goal </a:t>
+            </a:r>
+            <a:r>
+              <a:rPr lang="en-GB" sz="1800" dirty="0"/>
+              <a:t>is to get a foundational understanding you can build </a:t>
+            </a:r>
+            <a:r>
+              <a:rPr lang="en-GB" sz="1800" dirty="0" smtClean="0"/>
+              <a:t>upon and make the boarding easier on projects. </a:t>
+            </a:r>
+          </a:p>
+          <a:p>
+            <a:r>
+              <a:rPr lang="en-GB" sz="1800" dirty="0" smtClean="0"/>
+              <a:t>The course covers :</a:t>
+            </a:r>
+            <a:endParaRPr lang="en-GB" sz="1800" dirty="0"/>
+          </a:p>
+          <a:p>
+            <a:pPr lvl="1"/>
+            <a:r>
+              <a:rPr lang="en-GB" sz="1600" dirty="0" smtClean="0"/>
+              <a:t>The </a:t>
+            </a:r>
+            <a:r>
+              <a:rPr lang="en-GB" sz="1600" dirty="0" smtClean="0"/>
+              <a:t>basic </a:t>
+            </a:r>
+            <a:r>
+              <a:rPr lang="en-GB" sz="1600" dirty="0"/>
               <a:t>concepts of JavaScript</a:t>
             </a:r>
           </a:p>
           <a:p>
-            <a:r>
-              <a:rPr lang="en-GB" dirty="0"/>
+            <a:pPr lvl="1"/>
+            <a:r>
+              <a:rPr lang="en-GB" sz="1600" dirty="0"/>
               <a:t>Debugging</a:t>
             </a:r>
           </a:p>
           <a:p>
-            <a:r>
-              <a:rPr lang="en-GB" dirty="0"/>
+            <a:pPr lvl="1"/>
+            <a:r>
+              <a:rPr lang="en-GB" sz="1600" dirty="0"/>
               <a:t>Best </a:t>
             </a:r>
             <a:r>
-              <a:rPr lang="en-GB" dirty="0" smtClean="0"/>
+              <a:rPr lang="en-GB" sz="1600" dirty="0" smtClean="0"/>
               <a:t>practice</a:t>
             </a:r>
           </a:p>
           <a:p>
-            <a:endParaRPr lang="en-GB" dirty="0" smtClean="0"/>
-          </a:p>
-          <a:p>
-            <a:r>
-              <a:rPr lang="en-GB" dirty="0" smtClean="0"/>
-              <a:t>Goal is to get a foundational understanding you can build upon </a:t>
-            </a:r>
-            <a:endParaRPr lang="en-GB" dirty="0"/>
+            <a:endParaRPr lang="en-GB" sz="1800" dirty="0" smtClean="0"/>
+          </a:p>
+          <a:p>
+            <a:r>
+              <a:rPr lang="en-GB" sz="1800" dirty="0"/>
+              <a:t>The complete course can be found on </a:t>
+            </a:r>
+            <a:r>
+              <a:rPr lang="en-GB" sz="1800" dirty="0" err="1"/>
+              <a:t>BitBucket</a:t>
+            </a:r>
+            <a:r>
+              <a:rPr lang="en-GB" sz="1800" dirty="0"/>
+              <a:t>:</a:t>
+            </a:r>
+          </a:p>
+          <a:p>
+            <a:r>
+              <a:rPr lang="en-GB" sz="1800" dirty="0">
+                <a:hlinkClick r:id="rId2"/>
+              </a:rPr>
+              <a:t>https://</a:t>
+            </a:r>
+            <a:r>
+              <a:rPr lang="en-GB" sz="1800" dirty="0" smtClean="0">
+                <a:hlinkClick r:id="rId2"/>
+              </a:rPr>
+              <a:t>bitbucket.org/zuehlke/zrs_curriculum/src</a:t>
+            </a:r>
+            <a:endParaRPr lang="en-GB" sz="1800" dirty="0"/>
           </a:p>
         </p:txBody>
       </p:sp>
@@ -6390,38 +6427,58 @@
           <a:p>
             <a:r>
               <a:rPr lang="en-GB" dirty="0" smtClean="0"/>
-              <a:t>Tools you will need:</a:t>
-            </a:r>
+              <a:t>You will need the following tools:</a:t>
+            </a:r>
+            <a:endParaRPr lang="en-GB" dirty="0" smtClean="0"/>
           </a:p>
           <a:p>
             <a:pPr lvl="1"/>
             <a:r>
-              <a:rPr lang="en-GB" dirty="0" err="1" smtClean="0"/>
-              <a:t>MarkdownPad</a:t>
+              <a:rPr lang="en-GB" dirty="0" smtClean="0">
+                <a:hlinkClick r:id="rId3"/>
+              </a:rPr>
+              <a:t>MarkdownPad </a:t>
             </a:r>
             <a:r>
               <a:rPr lang="en-GB" dirty="0" smtClean="0"/>
-              <a:t> or a different markdown reader/editor</a:t>
+              <a:t>or a different markdown reader/editor</a:t>
             </a:r>
           </a:p>
           <a:p>
             <a:pPr lvl="1"/>
             <a:r>
-              <a:rPr lang="en-GB" dirty="0" err="1" smtClean="0"/>
-              <a:t>WebStorm</a:t>
+              <a:rPr lang="en-GB" dirty="0" smtClean="0">
+                <a:hlinkClick r:id="rId4"/>
+              </a:rPr>
+              <a:t>WebStorm </a:t>
             </a:r>
             <a:r>
               <a:rPr lang="en-GB" dirty="0" smtClean="0"/>
-              <a:t> or a different text editor/ IDE</a:t>
-            </a:r>
+              <a:t>or a different text editor/ </a:t>
+            </a:r>
+            <a:r>
+              <a:rPr lang="en-GB" dirty="0" smtClean="0"/>
+              <a:t>IDE with JavaScript syntax support</a:t>
+            </a:r>
+            <a:endParaRPr lang="en-GB" dirty="0" smtClean="0"/>
           </a:p>
           <a:p>
             <a:pPr lvl="1"/>
             <a:r>
-              <a:rPr lang="en-GB" dirty="0" err="1" smtClean="0"/>
+              <a:rPr lang="en-GB" dirty="0" smtClean="0">
+                <a:hlinkClick r:id="rId5"/>
+              </a:rPr>
               <a:t>NodeJs</a:t>
             </a:r>
-            <a:endParaRPr lang="en-GB" dirty="0" smtClean="0"/>
+            <a:endParaRPr lang="en-GB" dirty="0"/>
+          </a:p>
+          <a:p>
+            <a:pPr lvl="1"/>
+            <a:r>
+              <a:rPr lang="en-GB" dirty="0" smtClean="0"/>
+              <a:t>Some projects may require additional setup (ask if you need any help)</a:t>
+            </a:r>
+            <a:endParaRPr lang="en-GB" dirty="0"/>
           </a:p>
         </p:txBody>
       </p:sp>
@@ -6546,8 +6603,27 @@
                   </a:schemeClr>
                 </a:solidFill>
               </a:rPr>
-              <a:t>At the end of each presentations is an exercise</a:t>
-            </a:r>
+              <a:t>At the end of each presentations is an </a:t>
+            </a:r>
+            <a:r>
+              <a:rPr lang="en-GB" dirty="0" smtClean="0">
+                <a:solidFill>
+                  <a:schemeClr val="bg1">
+                    <a:lumMod val="75000"/>
+                    <a:lumOff val="25000"/>
+                  </a:schemeClr>
+                </a:solidFill>
+              </a:rPr>
+              <a:t>exercise you should try to solve</a:t>
+            </a:r>
+            <a:endParaRPr lang="en-GB" dirty="0" smtClean="0">
+              <a:solidFill>
+                <a:schemeClr val="bg1">
+                  <a:lumMod val="75000"/>
+                  <a:lumOff val="25000"/>
+                </a:schemeClr>
+              </a:solidFill>
+            </a:endParaRPr>
           </a:p>
           <a:p>
             <a:endParaRPr lang="en-GB" dirty="0" smtClean="0">
@@ -6685,8 +6761,17 @@
           <a:p>
             <a:r>
               <a:rPr lang="en-US" dirty="0" smtClean="0"/>
-              <a:t>The following topics are covered:</a:t>
-            </a:r>
+              <a:t>This course covers the  </a:t>
+            </a:r>
+            <a:r>
+              <a:rPr lang="en-US" dirty="0" smtClean="0"/>
+              <a:t>following </a:t>
+            </a:r>
+            <a:r>
+              <a:rPr lang="en-US" dirty="0" smtClean="0"/>
+              <a:t>topics:</a:t>
+            </a:r>
+            <a:endParaRPr lang="en-US" dirty="0" smtClean="0"/>
           </a:p>
           <a:p>
             <a:pPr lvl="1"/>
@@ -6867,57 +6952,51 @@
           <a:lstStyle/>
           <a:p>
             <a:r>
+              <a:rPr lang="en-US" dirty="0" smtClean="0"/>
+              <a:t>JavaScript basics presentation </a:t>
+            </a:r>
+            <a:r>
+              <a:rPr lang="en-US" dirty="0" smtClean="0"/>
+              <a:t>c</a:t>
+            </a:r>
+            <a:r>
+              <a:rPr lang="en-US" dirty="0" smtClean="0"/>
+              <a:t>overs the basic functionalities of the language </a:t>
+            </a:r>
+            <a:r>
+              <a:rPr lang="en-US" dirty="0" smtClean="0"/>
+              <a:t>by </a:t>
+            </a:r>
+            <a:r>
+              <a:rPr lang="en-US" dirty="0" smtClean="0"/>
+              <a:t>ECMAScript 5 specifications.</a:t>
+            </a:r>
+          </a:p>
+          <a:p>
+            <a:r>
+              <a:rPr lang="en-US" dirty="0" smtClean="0"/>
+              <a:t>It covers data types, operators, flow control and loops, error </a:t>
+            </a:r>
+            <a:r>
               <a:rPr lang="en-US" dirty="0"/>
-              <a:t>JS </a:t>
+              <a:t>handling (Error object, try...catch...</a:t>
             </a:r>
             <a:r>
               <a:rPr lang="en-US" dirty="0" smtClean="0"/>
-              <a:t>basics cover: </a:t>
-            </a:r>
-          </a:p>
-          <a:p>
-            <a:pPr lvl="1"/>
+              <a:t>finally) and scope </a:t>
+            </a:r>
+            <a:r>
+              <a:rPr lang="en-US" dirty="0"/>
+              <a:t>of </a:t>
+            </a:r>
             <a:r>
               <a:rPr lang="en-US" dirty="0" smtClean="0"/>
-              <a:t>types, </a:t>
-            </a:r>
-          </a:p>
-          <a:p>
-            <a:pPr lvl="1"/>
-            <a:r>
-              <a:rPr lang="en-US" dirty="0" smtClean="0"/>
-              <a:t>operators, </a:t>
-            </a:r>
-          </a:p>
-          <a:p>
-            <a:pPr lvl="1"/>
-            <a:r>
-              <a:rPr lang="en-US" dirty="0" smtClean="0"/>
-              <a:t>flow </a:t>
-            </a:r>
-            <a:r>
-              <a:rPr lang="en-US" dirty="0"/>
-              <a:t>control &amp; </a:t>
-            </a:r>
-            <a:r>
-              <a:rPr lang="en-US" dirty="0" smtClean="0"/>
-              <a:t>oops, </a:t>
-            </a:r>
-          </a:p>
-          <a:p>
-            <a:pPr lvl="1"/>
-            <a:r>
-              <a:rPr lang="en-US" dirty="0" smtClean="0"/>
-              <a:t>error </a:t>
-            </a:r>
-            <a:r>
-              <a:rPr lang="en-US" dirty="0"/>
-              <a:t>handling (Error object, try...catch...finally</a:t>
-            </a:r>
-            <a:r>
-              <a:rPr lang="en-US" dirty="0" smtClean="0"/>
-              <a:t>).</a:t>
-            </a:r>
+              <a:t>variables.</a:t>
+            </a:r>
+            <a:endParaRPr lang="en-US" dirty="0"/>
+          </a:p>
+          <a:p>
+            <a:endParaRPr lang="en-US" dirty="0"/>
           </a:p>
         </p:txBody>
       </p:sp>
@@ -6998,58 +7077,33 @@
           <a:p>
             <a:r>
               <a:rPr lang="en-US" dirty="0" smtClean="0"/>
-              <a:t>JS standard library presentation covers:</a:t>
-            </a:r>
-          </a:p>
-          <a:p>
-            <a:pPr lvl="1"/>
+              <a:t>JS standard library presentation </a:t>
+            </a:r>
             <a:r>
               <a:rPr lang="en-US" dirty="0" smtClean="0"/>
-              <a:t>array </a:t>
+              <a:t>covers </a:t>
             </a:r>
             <a:r>
               <a:rPr lang="en-US" dirty="0"/>
-              <a:t>manipulation</a:t>
-            </a:r>
-          </a:p>
-          <a:p>
-            <a:pPr lvl="1"/>
+              <a:t>built-in </a:t>
+            </a:r>
+            <a:r>
+              <a:rPr lang="en-US" dirty="0" smtClean="0"/>
+              <a:t>objects like Math, Date, Array and String</a:t>
+            </a:r>
             <a:r>
               <a:rPr lang="en-US" dirty="0"/>
-              <a:t>string manipulation</a:t>
-            </a:r>
-          </a:p>
-          <a:p>
-            <a:pPr lvl="1"/>
-            <a:r>
-              <a:rPr lang="en-US" dirty="0"/>
-              <a:t>Math</a:t>
-            </a:r>
-          </a:p>
-          <a:p>
-            <a:pPr lvl="1"/>
-            <a:r>
-              <a:rPr lang="en-US" dirty="0"/>
-              <a:t>Date</a:t>
-            </a:r>
-          </a:p>
-          <a:p>
-            <a:pPr lvl="1"/>
-            <a:r>
-              <a:rPr lang="en-US" dirty="0"/>
-              <a:t>3rd party (</a:t>
-            </a:r>
-            <a:r>
-              <a:rPr lang="en-US" dirty="0" err="1"/>
-              <a:t>lodash</a:t>
-            </a:r>
-            <a:r>
-              <a:rPr lang="en-US" dirty="0"/>
-              <a:t>, underscore</a:t>
+              <a:t> including their methods and properties</a:t>
             </a:r>
             <a:r>
               <a:rPr lang="en-US" dirty="0" smtClean="0"/>
-              <a:t>...) etc.</a:t>
+              <a:t>.</a:t>
+            </a:r>
+          </a:p>
+          <a:p>
+            <a:r>
+              <a:rPr lang="en-US" dirty="0" smtClean="0"/>
+              <a:t>The presentations provides an overview of built in functions that can be used to manipulate objects.</a:t>
             </a:r>
             <a:endParaRPr lang="en-US" dirty="0"/>
           </a:p>
@@ -7132,37 +7186,33 @@
           <a:p>
             <a:r>
               <a:rPr lang="en-US" dirty="0"/>
-              <a:t>HTML &amp; CSS basics</a:t>
+              <a:t>HTML &amp; CSS </a:t>
             </a:r>
             <a:r>
               <a:rPr lang="en-US" dirty="0" smtClean="0"/>
-              <a:t> presentation covers:</a:t>
-            </a:r>
-          </a:p>
-          <a:p>
-            <a:pPr lvl="1"/>
+              <a:t>basics go through the basic components of a web page like the HTML tags, CSS selectors</a:t>
+            </a:r>
             <a:r>
               <a:rPr lang="en-US" dirty="0"/>
-              <a:t>html tags</a:t>
-            </a:r>
-          </a:p>
-          <a:p>
-            <a:pPr lvl="1"/>
-            <a:r>
-              <a:rPr lang="en-US" dirty="0" err="1"/>
-              <a:t>css</a:t>
-            </a:r>
-            <a:r>
-              <a:rPr lang="en-US" dirty="0"/>
-              <a:t> selectors</a:t>
-            </a:r>
-          </a:p>
-          <a:p>
-            <a:pPr lvl="1"/>
+              <a:t> </a:t>
+            </a:r>
             <a:r>
               <a:rPr lang="en-US" dirty="0" smtClean="0"/>
-              <a:t>forms</a:t>
-            </a:r>
+              <a:t>and the HTML </a:t>
+            </a:r>
+            <a:r>
+              <a:rPr lang="en-US" dirty="0" smtClean="0"/>
+              <a:t>forms.</a:t>
+            </a:r>
+          </a:p>
+          <a:p>
+            <a:r>
+              <a:rPr lang="en-US" dirty="0" smtClean="0"/>
+              <a:t>The presentation gives a very basic overview of how web pages should be structured and how styling can be applied.</a:t>
+            </a:r>
+            <a:endParaRPr lang="en-US" dirty="0" smtClean="0"/>
+          </a:p>
+          <a:p>
             <a:endParaRPr lang="en-US" dirty="0"/>
           </a:p>
         </p:txBody>
@@ -7243,54 +7293,24 @@
           <a:lstStyle/>
           <a:p>
             <a:r>
-              <a:rPr lang="en-US" dirty="0"/>
-              <a:t>JS </a:t>
-            </a:r>
-            <a:r>
               <a:rPr lang="en-US" dirty="0" smtClean="0"/>
-              <a:t>functions presentation covers:</a:t>
-            </a:r>
-          </a:p>
-          <a:p>
-            <a:pPr lvl="1"/>
+              <a:t>JS functions presentation covers how functions can be declared</a:t>
+            </a:r>
             <a:r>
               <a:rPr lang="en-US" dirty="0" smtClean="0"/>
-              <a:t>function declarations</a:t>
-            </a:r>
-            <a:endParaRPr lang="en-US" dirty="0"/>
-          </a:p>
-          <a:p>
-            <a:pPr lvl="1"/>
-            <a:r>
-              <a:rPr lang="en-US" dirty="0"/>
-              <a:t>function expressions</a:t>
-            </a:r>
-          </a:p>
-          <a:p>
-            <a:pPr lvl="1"/>
-            <a:r>
-              <a:rPr lang="en-US" dirty="0"/>
-              <a:t>closures</a:t>
-            </a:r>
-          </a:p>
-          <a:p>
-            <a:pPr lvl="1"/>
-            <a:r>
-              <a:rPr lang="en-US" dirty="0"/>
-              <a:t>Self invoking functions</a:t>
-            </a:r>
-          </a:p>
-          <a:p>
-            <a:pPr lvl="1"/>
-            <a:r>
-              <a:rPr lang="en-US" dirty="0"/>
-              <a:t>How to organize </a:t>
+              <a:t>, gives an overview of closures</a:t>
             </a:r>
             <a:r>
               <a:rPr lang="en-US" dirty="0" smtClean="0"/>
-              <a:t>functions</a:t>
-            </a:r>
-            <a:endParaRPr lang="en-US" dirty="0"/>
+              <a:t>, scopes higher order functions.</a:t>
+            </a:r>
+          </a:p>
+          <a:p>
+            <a:r>
+              <a:rPr lang="en-US" dirty="0" smtClean="0"/>
+              <a:t>This presentation should give an insight on how JavaScript functions are different from functions in other programming languages.</a:t>
+            </a:r>
+            <a:endParaRPr lang="en-US" dirty="0" smtClean="0"/>
           </a:p>
         </p:txBody>
       </p:sp>

</xml_diff>